<commit_message>
added to movies movie details
</commit_message>
<xml_diff>
--- a/29_-_JS_angular_services.pptx
+++ b/29_-_JS_angular_services.pptx
@@ -113,6 +113,11 @@
       </a:defRPr>
     </a:lvl9pPr>
   </p:defaultTextStyle>
+  <p:extLst>
+    <p:ext uri="{EFAFB233-063F-42B5-8137-9DF3F51BA10A}">
+      <p15:sldGuideLst xmlns:p15="http://schemas.microsoft.com/office/powerpoint/2012/main"/>
+    </p:ext>
+  </p:extLst>
 </p:presentation>
 </file>
 
@@ -652,6 +657,95 @@
               <a:rPr lang="en-US" b="0" dirty="0"/>
               <a:t> operations)</a:t>
             </a:r>
+          </a:p>
+          <a:p>
+            <a:r>
+              <a:rPr lang="en-US" b="0" dirty="0"/>
+              <a:t> </a:t>
+            </a:r>
+            <a:r>
+              <a:rPr lang="en-US" b="0" dirty="0" err="1"/>
+              <a:t>var</a:t>
+            </a:r>
+            <a:r>
+              <a:rPr lang="en-US" b="0" dirty="0"/>
+              <a:t> </a:t>
+            </a:r>
+            <a:r>
+              <a:rPr lang="en-US" b="0" dirty="0" err="1"/>
+              <a:t>async</a:t>
+            </a:r>
+            <a:r>
+              <a:rPr lang="en-US" b="0" dirty="0"/>
+              <a:t> =  $</a:t>
+            </a:r>
+            <a:r>
+              <a:rPr lang="en-US" b="0" dirty="0" err="1"/>
+              <a:t>q.defer</a:t>
+            </a:r>
+            <a:r>
+              <a:rPr lang="en-US" b="0" dirty="0"/>
+              <a:t>(){</a:t>
+            </a:r>
+          </a:p>
+          <a:p>
+            <a:r>
+              <a:rPr lang="en-US" b="0" dirty="0"/>
+              <a:t>……..</a:t>
+            </a:r>
+          </a:p>
+          <a:p>
+            <a:r>
+              <a:rPr lang="en-US" b="0" dirty="0"/>
+              <a:t> </a:t>
+            </a:r>
+            <a:r>
+              <a:rPr lang="en-US" b="0" dirty="0" err="1"/>
+              <a:t>async.resolve</a:t>
+            </a:r>
+            <a:r>
+              <a:rPr lang="en-US" b="0" dirty="0"/>
+              <a:t>(); //for the first success callback in “then”</a:t>
+            </a:r>
+          </a:p>
+          <a:p>
+            <a:r>
+              <a:rPr lang="en-US" b="0" dirty="0"/>
+              <a:t> </a:t>
+            </a:r>
+            <a:r>
+              <a:rPr lang="en-US" b="0" dirty="0" err="1"/>
+              <a:t>async.reject</a:t>
+            </a:r>
+            <a:r>
+              <a:rPr lang="en-US" b="0" dirty="0"/>
+              <a:t>(); // for the second error callback in </a:t>
+            </a:r>
+            <a:r>
+              <a:rPr lang="en-US" b="0"/>
+              <a:t>“then”</a:t>
+            </a:r>
+            <a:endParaRPr lang="en-US" b="0" dirty="0"/>
+          </a:p>
+          <a:p>
+            <a:r>
+              <a:rPr lang="en-US" b="0" dirty="0"/>
+              <a:t>} </a:t>
+            </a:r>
+          </a:p>
+          <a:p>
+            <a:r>
+              <a:rPr lang="en-US" b="0" dirty="0"/>
+              <a:t>Return </a:t>
+            </a:r>
+            <a:r>
+              <a:rPr lang="en-US" b="0" dirty="0" err="1"/>
+              <a:t>async.promise</a:t>
+            </a:r>
+            <a:r>
+              <a:rPr lang="en-US" b="0" dirty="0"/>
+              <a:t>;</a:t>
+            </a:r>
             <a:endParaRPr lang="he-IL" b="1" dirty="0"/>
           </a:p>
         </p:txBody>
@@ -834,11 +928,13 @@
           <a:p>
             <a:r>
               <a:rPr lang="en-US" dirty="0"/>
-              <a:t>We can call to &lt;name&gt;.f1() that will call one function inside the service. &lt;name&gt;.three() cannot be called outside </a:t>
-            </a:r>
-            <a:r>
-              <a:rPr lang="en-US"/>
-              <a:t>the service.</a:t>
+              <a:t>We can call to &lt;name&gt;.f1() that will call one function inside the service. &lt;name&gt;.three() cannot be called outside the service.</a:t>
+            </a:r>
+          </a:p>
+          <a:p>
+            <a:r>
+              <a:rPr lang="en-US" dirty="0"/>
+              <a:t>The use for service is to take the data model out of the controller and put it in the service</a:t>
             </a:r>
             <a:endParaRPr lang="he-IL" dirty="0"/>
           </a:p>

</xml_diff>